<commit_message>
got rid of the meme stuff
</commit_message>
<xml_diff>
--- a/Powerpoint.pptx
+++ b/Powerpoint.pptx
@@ -312,6 +312,11 @@
       </a:defRPr>
     </a:lvl9pPr>
   </p:defaultTextStyle>
+  <p:extLst>
+    <p:ext uri="{EFAFB233-063F-42B5-8137-9DF3F51BA10A}">
+      <p15:sldGuideLst xmlns:p15="http://schemas.microsoft.com/office/powerpoint/2012/main"/>
+    </p:ext>
+  </p:extLst>
 </p:presentation>
 </file>
 
@@ -2550,7 +2555,7 @@
           </a:ln>
           <a:extLst>
             <a:ext uri="{C572A759-6A51-4108-AA02-DFA0A04FC94B}">
-              <ma14:wrappingTextBoxFlag xmlns:ma14="http://schemas.microsoft.com/office/mac/drawingml/2011/main" xmlns:a14="http://schemas.microsoft.com/office/drawing/2010/main" xmlns:m="http://schemas.openxmlformats.org/officeDocument/2006/math" xmlns="" val="1"/>
+              <ma14:wrappingTextBoxFlag xmlns="" xmlns:m="http://schemas.openxmlformats.org/officeDocument/2006/math" xmlns:a14="http://schemas.microsoft.com/office/drawing/2010/main" xmlns:ma14="http://schemas.microsoft.com/office/mac/drawingml/2011/main" val="1"/>
             </a:ext>
           </a:extLst>
         </p:spPr>
@@ -2589,7 +2594,7 @@
           </a:ln>
           <a:extLst>
             <a:ext uri="{C572A759-6A51-4108-AA02-DFA0A04FC94B}">
-              <ma14:wrappingTextBoxFlag xmlns:ma14="http://schemas.microsoft.com/office/mac/drawingml/2011/main" xmlns:a14="http://schemas.microsoft.com/office/drawing/2010/main" xmlns:m="http://schemas.openxmlformats.org/officeDocument/2006/math" xmlns="" val="1"/>
+              <ma14:wrappingTextBoxFlag xmlns="" xmlns:m="http://schemas.openxmlformats.org/officeDocument/2006/math" xmlns:a14="http://schemas.microsoft.com/office/drawing/2010/main" xmlns:ma14="http://schemas.microsoft.com/office/mac/drawingml/2011/main" val="1"/>
             </a:ext>
           </a:extLst>
         </p:spPr>
@@ -3680,7 +3685,7 @@
           </a:ln>
           <a:extLst>
             <a:ext uri="{C572A759-6A51-4108-AA02-DFA0A04FC94B}">
-              <ma14:wrappingTextBoxFlag xmlns:ma14="http://schemas.microsoft.com/office/mac/drawingml/2011/main" xmlns:a14="http://schemas.microsoft.com/office/drawing/2010/main" xmlns:m="http://schemas.openxmlformats.org/officeDocument/2006/math" xmlns="" val="1"/>
+              <ma14:wrappingTextBoxFlag xmlns="" xmlns:m="http://schemas.openxmlformats.org/officeDocument/2006/math" xmlns:a14="http://schemas.microsoft.com/office/drawing/2010/main" xmlns:ma14="http://schemas.microsoft.com/office/mac/drawingml/2011/main" val="1"/>
             </a:ext>
           </a:extLst>
         </p:spPr>
@@ -3723,7 +3728,7 @@
           </a:ln>
           <a:extLst>
             <a:ext uri="{C572A759-6A51-4108-AA02-DFA0A04FC94B}">
-              <ma14:wrappingTextBoxFlag xmlns:ma14="http://schemas.microsoft.com/office/mac/drawingml/2011/main" xmlns:a14="http://schemas.microsoft.com/office/drawing/2010/main" xmlns:m="http://schemas.openxmlformats.org/officeDocument/2006/math" xmlns="" val="1"/>
+              <ma14:wrappingTextBoxFlag xmlns="" xmlns:m="http://schemas.openxmlformats.org/officeDocument/2006/math" xmlns:a14="http://schemas.microsoft.com/office/drawing/2010/main" xmlns:ma14="http://schemas.microsoft.com/office/mac/drawingml/2011/main" val="1"/>
             </a:ext>
           </a:extLst>
         </p:spPr>
@@ -4008,6 +4013,7 @@
               <a:defRPr b="1"/>
             </a:pPr>
             <a:r>
+              <a:rPr dirty="0"/>
               <a:t>Backend</a:t>
             </a:r>
           </a:p>
@@ -4016,7 +4022,28 @@
               <a:buChar char=" "/>
             </a:pPr>
             <a:r>
-              <a:t>sqlite database, cleaned and developed using Jupyter notebook, SQLAlchemy, SQLite3</a:t>
+              <a:rPr dirty="0" err="1"/>
+              <a:t>sqlite</a:t>
+            </a:r>
+            <a:r>
+              <a:rPr dirty="0"/>
+              <a:t> database, cleaned and developed using </a:t>
+            </a:r>
+            <a:r>
+              <a:rPr dirty="0" err="1"/>
+              <a:t>Jupyter</a:t>
+            </a:r>
+            <a:r>
+              <a:rPr dirty="0"/>
+              <a:t> notebook, </a:t>
+            </a:r>
+            <a:r>
+              <a:rPr dirty="0" err="1"/>
+              <a:t>SQLAlchemy</a:t>
+            </a:r>
+            <a:r>
+              <a:rPr dirty="0"/>
+              <a:t>, SQLite3</a:t>
             </a:r>
           </a:p>
           <a:p>
@@ -4024,7 +4051,16 @@
               <a:buChar char=" "/>
             </a:pPr>
             <a:r>
-              <a:t>Flask app serves our data via several routes allowing devs to access tickers by Sector (Category), Date, or Name</a:t>
+              <a:rPr dirty="0"/>
+              <a:t>Flask app serves our data via several routes allowing </a:t>
+            </a:r>
+            <a:r>
+              <a:rPr dirty="0" err="1"/>
+              <a:t>devs</a:t>
+            </a:r>
+            <a:r>
+              <a:rPr dirty="0"/>
+              <a:t> to access tickers by Sector (Category), Date, or Name</a:t>
             </a:r>
           </a:p>
           <a:p>
@@ -4032,10 +4068,11 @@
               <a:buChar char=" "/>
             </a:pPr>
             <a:r>
-              <a:rPr b="1"/>
+              <a:rPr b="1" dirty="0"/>
               <a:t>Frontend</a:t>
             </a:r>
             <a:r>
+              <a:rPr dirty="0"/>
               <a:t> </a:t>
             </a:r>
           </a:p>
@@ -4044,15 +4081,34 @@
               <a:buChar char=" "/>
             </a:pPr>
             <a:r>
-              <a:t>Bootstrap, D3, ObservableHQ add-ons (D3), Plotly</a:t>
-            </a:r>
+              <a:rPr dirty="0"/>
+              <a:t>Bootstrap, D3, </a:t>
+            </a:r>
+            <a:r>
+              <a:rPr dirty="0" err="1"/>
+              <a:t>ObservableHQ</a:t>
+            </a:r>
+            <a:r>
+              <a:rPr dirty="0"/>
+              <a:t> add-ons (D3), </a:t>
+            </a:r>
+            <a:r>
+              <a:rPr dirty="0" err="1"/>
+              <a:t>Plotly</a:t>
+            </a:r>
+            <a:endParaRPr dirty="0"/>
           </a:p>
           <a:p>
             <a:pPr marL="292608" lvl="1" indent="-91440">
               <a:buChar char=" "/>
             </a:pPr>
             <a:r>
-              <a:t>ObservableHQ add-ons: Multiline chart, Tree map, Bubble chart</a:t>
+              <a:rPr dirty="0" err="1"/>
+              <a:t>ObservableHQ</a:t>
+            </a:r>
+            <a:r>
+              <a:rPr dirty="0"/>
+              <a:t> add-ons: Multiline chart, Tree map, Bubble chart</a:t>
             </a:r>
           </a:p>
         </p:txBody>

</xml_diff>